<commit_message>
Dokumentáció. más fájlokba kis simítások
Dokumentáció 60% kész
</commit_message>
<xml_diff>
--- a/prezentáció.pptx
+++ b/prezentáció.pptx
@@ -5866,7 +5866,7 @@
                 <a:effectLst/>
                 <a:latin typeface="Arial" panose="020B0604020202020204" pitchFamily="34" charset="0"/>
               </a:rPr>
-              <a:t> keretrendszert használtunk JavaScript kiegészítősablonnal</a:t>
+              <a:t> keretrendszert JavaScripttel telepítettük</a:t>
             </a:r>
           </a:p>
           <a:p>
@@ -11222,13 +11222,13 @@
   <p:clrMapOvr>
     <a:masterClrMapping/>
   </p:clrMapOvr>
-  <mc:AlternateContent xmlns:mc="http://schemas.openxmlformats.org/markup-compatibility/2006">
-    <mc:Choice xmlns:p14="http://schemas.microsoft.com/office/powerpoint/2010/main" Requires="p14">
+  <mc:AlternateContent xmlns:mc="http://schemas.openxmlformats.org/markup-compatibility/2006" xmlns:p14="http://schemas.microsoft.com/office/powerpoint/2010/main">
+    <mc:Choice Requires="p14">
       <p:transition spd="slow" p14:dur="1300">
         <p14:pan dir="u"/>
       </p:transition>
     </mc:Choice>
-    <mc:Fallback>
+    <mc:Fallback xmlns="">
       <p:transition spd="slow">
         <p:fade/>
       </p:transition>
@@ -11485,13 +11485,13 @@
   <p:clrMapOvr>
     <a:masterClrMapping/>
   </p:clrMapOvr>
-  <mc:AlternateContent xmlns:mc="http://schemas.openxmlformats.org/markup-compatibility/2006">
-    <mc:Choice xmlns:p14="http://schemas.microsoft.com/office/powerpoint/2010/main" Requires="p14">
+  <mc:AlternateContent xmlns:mc="http://schemas.openxmlformats.org/markup-compatibility/2006" xmlns:p14="http://schemas.microsoft.com/office/powerpoint/2010/main">
+    <mc:Choice Requires="p14">
       <p:transition spd="slow" p14:dur="1300">
         <p14:pan dir="u"/>
       </p:transition>
     </mc:Choice>
-    <mc:Fallback>
+    <mc:Fallback xmlns="">
       <p:transition spd="slow">
         <p:fade/>
       </p:transition>
@@ -11937,7 +11937,7 @@
         </p:nvSpPr>
         <p:spPr>
           <a:xfrm>
-            <a:off x="6351024" y="788389"/>
+            <a:off x="6395413" y="733880"/>
             <a:ext cx="2477419" cy="803275"/>
           </a:xfrm>
         </p:spPr>
@@ -11997,13 +11997,13 @@
   <p:clrMapOvr>
     <a:masterClrMapping/>
   </p:clrMapOvr>
-  <mc:AlternateContent xmlns:mc="http://schemas.openxmlformats.org/markup-compatibility/2006">
-    <mc:Choice xmlns:p14="http://schemas.microsoft.com/office/powerpoint/2010/main" Requires="p14">
+  <mc:AlternateContent xmlns:mc="http://schemas.openxmlformats.org/markup-compatibility/2006" xmlns:p14="http://schemas.microsoft.com/office/powerpoint/2010/main">
+    <mc:Choice Requires="p14">
       <p:transition spd="slow" p14:dur="1300">
         <p14:pan dir="u"/>
       </p:transition>
     </mc:Choice>
-    <mc:Fallback>
+    <mc:Fallback xmlns="">
       <p:transition spd="slow">
         <p:fade/>
       </p:transition>
@@ -12453,13 +12453,13 @@
   <p:clrMapOvr>
     <a:masterClrMapping/>
   </p:clrMapOvr>
-  <mc:AlternateContent xmlns:mc="http://schemas.openxmlformats.org/markup-compatibility/2006">
-    <mc:Choice xmlns:p14="http://schemas.microsoft.com/office/powerpoint/2010/main" Requires="p14">
+  <mc:AlternateContent xmlns:mc="http://schemas.openxmlformats.org/markup-compatibility/2006" xmlns:p14="http://schemas.microsoft.com/office/powerpoint/2010/main">
+    <mc:Choice Requires="p14">
       <p:transition spd="slow" p14:dur="1300">
         <p14:pan dir="u"/>
       </p:transition>
     </mc:Choice>
-    <mc:Fallback>
+    <mc:Fallback xmlns="">
       <p:transition spd="slow">
         <p:fade/>
       </p:transition>
@@ -12578,13 +12578,13 @@
   <p:clrMapOvr>
     <a:masterClrMapping/>
   </p:clrMapOvr>
-  <mc:AlternateContent xmlns:mc="http://schemas.openxmlformats.org/markup-compatibility/2006">
-    <mc:Choice xmlns:p14="http://schemas.microsoft.com/office/powerpoint/2010/main" Requires="p14">
+  <mc:AlternateContent xmlns:mc="http://schemas.openxmlformats.org/markup-compatibility/2006" xmlns:p14="http://schemas.microsoft.com/office/powerpoint/2010/main">
+    <mc:Choice Requires="p14">
       <p:transition spd="slow" p14:dur="1300">
         <p14:pan dir="u"/>
       </p:transition>
     </mc:Choice>
-    <mc:Fallback>
+    <mc:Fallback xmlns="">
       <p:transition spd="slow">
         <p:fade/>
       </p:transition>
@@ -12887,13 +12887,13 @@
   <p:clrMapOvr>
     <a:masterClrMapping/>
   </p:clrMapOvr>
-  <mc:AlternateContent xmlns:mc="http://schemas.openxmlformats.org/markup-compatibility/2006">
-    <mc:Choice xmlns:p14="http://schemas.microsoft.com/office/powerpoint/2010/main" Requires="p14">
+  <mc:AlternateContent xmlns:mc="http://schemas.openxmlformats.org/markup-compatibility/2006" xmlns:p14="http://schemas.microsoft.com/office/powerpoint/2010/main">
+    <mc:Choice Requires="p14">
       <p:transition spd="slow" p14:dur="1300">
         <p14:pan dir="u"/>
       </p:transition>
     </mc:Choice>
-    <mc:Fallback>
+    <mc:Fallback xmlns="">
       <p:transition spd="slow">
         <p:fade/>
       </p:transition>
@@ -13283,13 +13283,13 @@
   <p:clrMapOvr>
     <a:masterClrMapping/>
   </p:clrMapOvr>
-  <mc:AlternateContent xmlns:mc="http://schemas.openxmlformats.org/markup-compatibility/2006">
-    <mc:Choice xmlns:p14="http://schemas.microsoft.com/office/powerpoint/2010/main" Requires="p14">
+  <mc:AlternateContent xmlns:mc="http://schemas.openxmlformats.org/markup-compatibility/2006" xmlns:p14="http://schemas.microsoft.com/office/powerpoint/2010/main">
+    <mc:Choice Requires="p14">
       <p:transition spd="slow" p14:dur="1300">
         <p14:pan dir="u"/>
       </p:transition>
     </mc:Choice>
-    <mc:Fallback>
+    <mc:Fallback xmlns="">
       <p:transition spd="slow">
         <p:fade/>
       </p:transition>
@@ -13435,13 +13435,13 @@
   <p:clrMapOvr>
     <a:masterClrMapping/>
   </p:clrMapOvr>
-  <mc:AlternateContent xmlns:mc="http://schemas.openxmlformats.org/markup-compatibility/2006">
-    <mc:Choice xmlns:p14="http://schemas.microsoft.com/office/powerpoint/2010/main" Requires="p14">
+  <mc:AlternateContent xmlns:mc="http://schemas.openxmlformats.org/markup-compatibility/2006" xmlns:p14="http://schemas.microsoft.com/office/powerpoint/2010/main">
+    <mc:Choice Requires="p14">
       <p:transition spd="slow" p14:dur="1300">
         <p14:pan dir="u"/>
       </p:transition>
     </mc:Choice>
-    <mc:Fallback>
+    <mc:Fallback xmlns="">
       <p:transition spd="slow">
         <p:fade/>
       </p:transition>
@@ -13527,7 +13527,9 @@
           </a:xfrm>
         </p:spPr>
         <p:txBody>
-          <a:bodyPr/>
+          <a:bodyPr>
+            <a:normAutofit/>
+          </a:bodyPr>
           <a:lstStyle/>
           <a:p>
             <a:r>
@@ -13612,6 +13614,21 @@
             <a:r>
               <a:rPr lang="hu-HU" dirty="0" err="1"/>
               <a:t>Bootstrap</a:t>
+            </a:r>
+            <a:br>
+              <a:rPr lang="hu-HU" dirty="0"/>
+            </a:br>
+            <a:r>
+              <a:rPr lang="hu-HU" dirty="0"/>
+              <a:t>	</a:t>
+            </a:r>
+            <a:r>
+              <a:rPr lang="hu-HU" dirty="0" err="1"/>
+              <a:t>React</a:t>
+            </a:r>
+            <a:r>
+              <a:rPr lang="hu-HU" dirty="0"/>
+              <a:t>-Router</a:t>
             </a:r>
             <a:br>
               <a:rPr lang="hu-HU" dirty="0"/>
@@ -13730,13 +13747,13 @@
   <p:clrMapOvr>
     <a:masterClrMapping/>
   </p:clrMapOvr>
-  <mc:AlternateContent xmlns:mc="http://schemas.openxmlformats.org/markup-compatibility/2006">
-    <mc:Choice xmlns:p14="http://schemas.microsoft.com/office/powerpoint/2010/main" Requires="p14">
+  <mc:AlternateContent xmlns:mc="http://schemas.openxmlformats.org/markup-compatibility/2006" xmlns:p14="http://schemas.microsoft.com/office/powerpoint/2010/main">
+    <mc:Choice Requires="p14">
       <p:transition spd="slow" p14:dur="1300">
         <p14:pan dir="u"/>
       </p:transition>
     </mc:Choice>
-    <mc:Fallback>
+    <mc:Fallback xmlns="">
       <p:transition spd="slow">
         <p:fade/>
       </p:transition>
@@ -13921,13 +13938,13 @@
   <p:clrMapOvr>
     <a:masterClrMapping/>
   </p:clrMapOvr>
-  <mc:AlternateContent xmlns:mc="http://schemas.openxmlformats.org/markup-compatibility/2006">
-    <mc:Choice xmlns:p14="http://schemas.microsoft.com/office/powerpoint/2010/main" Requires="p14">
+  <mc:AlternateContent xmlns:mc="http://schemas.openxmlformats.org/markup-compatibility/2006" xmlns:p14="http://schemas.microsoft.com/office/powerpoint/2010/main">
+    <mc:Choice Requires="p14">
       <p:transition spd="slow" p14:dur="1300">
         <p14:pan dir="u"/>
       </p:transition>
     </mc:Choice>
-    <mc:Fallback>
+    <mc:Fallback xmlns="">
       <p:transition spd="slow">
         <p:fade/>
       </p:transition>
@@ -14081,13 +14098,13 @@
   <p:clrMapOvr>
     <a:masterClrMapping/>
   </p:clrMapOvr>
-  <mc:AlternateContent xmlns:mc="http://schemas.openxmlformats.org/markup-compatibility/2006">
-    <mc:Choice xmlns:p14="http://schemas.microsoft.com/office/powerpoint/2010/main" Requires="p14">
+  <mc:AlternateContent xmlns:mc="http://schemas.openxmlformats.org/markup-compatibility/2006" xmlns:p14="http://schemas.microsoft.com/office/powerpoint/2010/main">
+    <mc:Choice Requires="p14">
       <p:transition spd="slow" p14:dur="1300">
         <p14:pan dir="u"/>
       </p:transition>
     </mc:Choice>
-    <mc:Fallback>
+    <mc:Fallback xmlns="">
       <p:transition spd="slow">
         <p:fade/>
       </p:transition>
@@ -14244,13 +14261,13 @@
   <p:clrMapOvr>
     <a:masterClrMapping/>
   </p:clrMapOvr>
-  <mc:AlternateContent xmlns:mc="http://schemas.openxmlformats.org/markup-compatibility/2006">
-    <mc:Choice xmlns:p14="http://schemas.microsoft.com/office/powerpoint/2010/main" Requires="p14">
+  <mc:AlternateContent xmlns:mc="http://schemas.openxmlformats.org/markup-compatibility/2006" xmlns:p14="http://schemas.microsoft.com/office/powerpoint/2010/main">
+    <mc:Choice Requires="p14">
       <p:transition spd="slow" p14:dur="1300">
         <p14:pan dir="u"/>
       </p:transition>
     </mc:Choice>
-    <mc:Fallback>
+    <mc:Fallback xmlns="">
       <p:transition spd="slow">
         <p:fade/>
       </p:transition>
@@ -14453,13 +14470,13 @@
   <p:clrMapOvr>
     <a:masterClrMapping/>
   </p:clrMapOvr>
-  <mc:AlternateContent xmlns:mc="http://schemas.openxmlformats.org/markup-compatibility/2006">
-    <mc:Choice xmlns:p14="http://schemas.microsoft.com/office/powerpoint/2010/main" Requires="p14">
+  <mc:AlternateContent xmlns:mc="http://schemas.openxmlformats.org/markup-compatibility/2006" xmlns:p14="http://schemas.microsoft.com/office/powerpoint/2010/main">
+    <mc:Choice Requires="p14">
       <p:transition spd="slow" p14:dur="1300">
         <p14:pan dir="u"/>
       </p:transition>
     </mc:Choice>
-    <mc:Fallback>
+    <mc:Fallback xmlns="">
       <p:transition spd="slow">
         <p:fade/>
       </p:transition>
@@ -14697,13 +14714,13 @@
   <p:clrMapOvr>
     <a:masterClrMapping/>
   </p:clrMapOvr>
-  <mc:AlternateContent xmlns:mc="http://schemas.openxmlformats.org/markup-compatibility/2006">
-    <mc:Choice xmlns:p14="http://schemas.microsoft.com/office/powerpoint/2010/main" Requires="p14">
+  <mc:AlternateContent xmlns:mc="http://schemas.openxmlformats.org/markup-compatibility/2006" xmlns:p14="http://schemas.microsoft.com/office/powerpoint/2010/main">
+    <mc:Choice Requires="p14">
       <p:transition spd="slow" p14:dur="1300">
         <p14:pan dir="u"/>
       </p:transition>
     </mc:Choice>
-    <mc:Fallback>
+    <mc:Fallback xmlns="">
       <p:transition spd="slow">
         <p:fade/>
       </p:transition>
@@ -15534,6 +15551,15 @@
 </file>
 
 <file path=customXml/item1.xml><?xml version="1.0" encoding="utf-8"?>
+<?mso-contentType ?>
+<FormTemplates xmlns="http://schemas.microsoft.com/sharepoint/v3/contenttype/forms">
+  <Display>DocumentLibraryForm</Display>
+  <Edit>DocumentLibraryForm</Edit>
+  <New>DocumentLibraryForm</New>
+</FormTemplates>
+</file>
+
+<file path=customXml/item2.xml><?xml version="1.0" encoding="utf-8"?>
 <ct:contentTypeSchema xmlns:ct="http://schemas.microsoft.com/office/2006/metadata/contentType" xmlns:ma="http://schemas.microsoft.com/office/2006/metadata/properties/metaAttributes" ct:_="" ma:_="" ma:contentTypeName="Document" ma:contentTypeID="0x01010079F111ED35F8CC479449609E8A0923A6" ma:contentTypeVersion="11" ma:contentTypeDescription="Create a new document." ma:contentTypeScope="" ma:versionID="1c2eb7a32e66fb6e4260f3771546a5e2">
   <xsd:schema xmlns:xsd="http://www.w3.org/2001/XMLSchema" xmlns:xs="http://www.w3.org/2001/XMLSchema" xmlns:p="http://schemas.microsoft.com/office/2006/metadata/properties" xmlns:ns2="71af3243-3dd4-4a8d-8c0d-dd76da1f02a5" xmlns:ns3="16c05727-aa75-4e4a-9b5f-8a80a1165891" targetNamespace="http://schemas.microsoft.com/office/2006/metadata/properties" ma:root="true" ma:fieldsID="04e1f6479c48b08974ba73b5ca973489" ns2:_="" ns3:_="">
     <xsd:import namespace="71af3243-3dd4-4a8d-8c0d-dd76da1f02a5"/>
@@ -15744,15 +15770,6 @@
 </ct:contentTypeSchema>
 </file>
 
-<file path=customXml/item2.xml><?xml version="1.0" encoding="utf-8"?>
-<?mso-contentType ?>
-<FormTemplates xmlns="http://schemas.microsoft.com/sharepoint/v3/contenttype/forms">
-  <Display>DocumentLibraryForm</Display>
-  <Edit>DocumentLibraryForm</Edit>
-  <New>DocumentLibraryForm</New>
-</FormTemplates>
-</file>
-
 <file path=customXml/item3.xml><?xml version="1.0" encoding="utf-8"?>
 <p:properties xmlns:p="http://schemas.microsoft.com/office/2006/metadata/properties" xmlns:xsi="http://www.w3.org/2001/XMLSchema-instance" xmlns:pc="http://schemas.microsoft.com/office/infopath/2007/PartnerControls">
   <documentManagement>
@@ -15762,6 +15779,14 @@
 </file>
 
 <file path=customXml/itemProps1.xml><?xml version="1.0" encoding="utf-8"?>
+<ds:datastoreItem xmlns:ds="http://schemas.openxmlformats.org/officeDocument/2006/customXml" ds:itemID="{DFB9BFA2-1FA5-44A1-B975-10D6BF58ECD0}">
+  <ds:schemaRefs>
+    <ds:schemaRef ds:uri="http://schemas.microsoft.com/sharepoint/v3/contenttype/forms"/>
+  </ds:schemaRefs>
+</ds:datastoreItem>
+</file>
+
+<file path=customXml/itemProps2.xml><?xml version="1.0" encoding="utf-8"?>
 <ds:datastoreItem xmlns:ds="http://schemas.openxmlformats.org/officeDocument/2006/customXml" ds:itemID="{E577E783-5AB8-45E6-9E56-AE40075231B2}">
   <ds:schemaRefs>
     <ds:schemaRef ds:uri="http://schemas.microsoft.com/office/2006/metadata/contentType"/>
@@ -15776,14 +15801,6 @@
     <ds:schemaRef ds:uri="http://purl.org/dc/elements/1.1/"/>
     <ds:schemaRef ds:uri="http://purl.org/dc/terms/"/>
     <ds:schemaRef ds:uri="http://schemas.microsoft.com/internal/obd"/>
-  </ds:schemaRefs>
-</ds:datastoreItem>
-</file>
-
-<file path=customXml/itemProps2.xml><?xml version="1.0" encoding="utf-8"?>
-<ds:datastoreItem xmlns:ds="http://schemas.openxmlformats.org/officeDocument/2006/customXml" ds:itemID="{DFB9BFA2-1FA5-44A1-B975-10D6BF58ECD0}">
-  <ds:schemaRefs>
-    <ds:schemaRef ds:uri="http://schemas.microsoft.com/sharepoint/v3/contenttype/forms"/>
   </ds:schemaRefs>
 </ds:datastoreItem>
 </file>

</xml_diff>